<commit_message>
Some modifications to the capstone presentation slides. Added a demo UI spec to the repo.
</commit_message>
<xml_diff>
--- a/CapstonePresentation_oosterjm.pptx
+++ b/CapstonePresentation_oosterjm.pptx
@@ -11,14 +11,15 @@
     <p:sldId id="259" r:id="rId5"/>
     <p:sldId id="260" r:id="rId6"/>
     <p:sldId id="261" r:id="rId7"/>
-    <p:sldId id="262" r:id="rId8"/>
-    <p:sldId id="263" r:id="rId9"/>
-    <p:sldId id="264" r:id="rId10"/>
-    <p:sldId id="265" r:id="rId11"/>
-    <p:sldId id="266" r:id="rId12"/>
-    <p:sldId id="267" r:id="rId13"/>
-    <p:sldId id="268" r:id="rId14"/>
-    <p:sldId id="269" r:id="rId15"/>
+    <p:sldId id="270" r:id="rId8"/>
+    <p:sldId id="262" r:id="rId9"/>
+    <p:sldId id="263" r:id="rId10"/>
+    <p:sldId id="264" r:id="rId11"/>
+    <p:sldId id="265" r:id="rId12"/>
+    <p:sldId id="266" r:id="rId13"/>
+    <p:sldId id="267" r:id="rId14"/>
+    <p:sldId id="268" r:id="rId15"/>
+    <p:sldId id="269" r:id="rId16"/>
   </p:sldIdLst>
   <p:sldSz cx="12192000" cy="6858000"/>
   <p:notesSz cx="6858000" cy="9144000"/>
@@ -117,6 +118,11 @@
       </a:defRPr>
     </a:lvl9pPr>
   </p:defaultTextStyle>
+  <p:extLst>
+    <p:ext uri="{EFAFB233-063F-42B5-8137-9DF3F51BA10A}">
+      <p15:sldGuideLst xmlns:p15="http://schemas.microsoft.com/office/powerpoint/2012/main"/>
+    </p:ext>
+  </p:extLst>
 </p:presentation>
 </file>
 
@@ -4402,7 +4408,7 @@
           <a:p>
             <a:fld id="{B47DF217-C59D-452D-8E59-553006198AD7}" type="datetimeFigureOut">
               <a:rPr lang="en-US" smtClean="0"/>
-              <a:t>10/27/2024</a:t>
+              <a:t>2/14/2025</a:t>
             </a:fld>
             <a:endParaRPr lang="en-US"/>
           </a:p>
@@ -4669,7 +4675,7 @@
           <a:p>
             <a:fld id="{B47DF217-C59D-452D-8E59-553006198AD7}" type="datetimeFigureOut">
               <a:rPr lang="en-US" smtClean="0"/>
-              <a:t>10/27/2024</a:t>
+              <a:t>2/14/2025</a:t>
             </a:fld>
             <a:endParaRPr lang="en-US"/>
           </a:p>
@@ -4865,7 +4871,7 @@
           <a:p>
             <a:fld id="{B47DF217-C59D-452D-8E59-553006198AD7}" type="datetimeFigureOut">
               <a:rPr lang="en-US" smtClean="0"/>
-              <a:t>10/27/2024</a:t>
+              <a:t>2/14/2025</a:t>
             </a:fld>
             <a:endParaRPr lang="en-US"/>
           </a:p>
@@ -5128,7 +5134,7 @@
           <a:p>
             <a:fld id="{B47DF217-C59D-452D-8E59-553006198AD7}" type="datetimeFigureOut">
               <a:rPr lang="en-US" smtClean="0"/>
-              <a:t>10/27/2024</a:t>
+              <a:t>2/14/2025</a:t>
             </a:fld>
             <a:endParaRPr lang="en-US"/>
           </a:p>
@@ -5562,7 +5568,7 @@
           <a:p>
             <a:fld id="{B47DF217-C59D-452D-8E59-553006198AD7}" type="datetimeFigureOut">
               <a:rPr lang="en-US" smtClean="0"/>
-              <a:t>10/27/2024</a:t>
+              <a:t>2/14/2025</a:t>
             </a:fld>
             <a:endParaRPr lang="en-US"/>
           </a:p>
@@ -6108,7 +6114,7 @@
           <a:p>
             <a:fld id="{B47DF217-C59D-452D-8E59-553006198AD7}" type="datetimeFigureOut">
               <a:rPr lang="en-US" smtClean="0"/>
-              <a:t>10/27/2024</a:t>
+              <a:t>2/14/2025</a:t>
             </a:fld>
             <a:endParaRPr lang="en-US"/>
           </a:p>
@@ -6828,7 +6834,7 @@
           <a:p>
             <a:fld id="{B47DF217-C59D-452D-8E59-553006198AD7}" type="datetimeFigureOut">
               <a:rPr lang="en-US" smtClean="0"/>
-              <a:t>10/27/2024</a:t>
+              <a:t>2/14/2025</a:t>
             </a:fld>
             <a:endParaRPr lang="en-US"/>
           </a:p>
@@ -6998,7 +7004,7 @@
           <a:p>
             <a:fld id="{B47DF217-C59D-452D-8E59-553006198AD7}" type="datetimeFigureOut">
               <a:rPr lang="en-US" smtClean="0"/>
-              <a:t>10/27/2024</a:t>
+              <a:t>2/14/2025</a:t>
             </a:fld>
             <a:endParaRPr lang="en-US"/>
           </a:p>
@@ -7178,7 +7184,7 @@
           <a:p>
             <a:fld id="{B47DF217-C59D-452D-8E59-553006198AD7}" type="datetimeFigureOut">
               <a:rPr lang="en-US" smtClean="0"/>
-              <a:t>10/27/2024</a:t>
+              <a:t>2/14/2025</a:t>
             </a:fld>
             <a:endParaRPr lang="en-US"/>
           </a:p>
@@ -7348,7 +7354,7 @@
           <a:p>
             <a:fld id="{B47DF217-C59D-452D-8E59-553006198AD7}" type="datetimeFigureOut">
               <a:rPr lang="en-US" smtClean="0"/>
-              <a:t>10/27/2024</a:t>
+              <a:t>2/14/2025</a:t>
             </a:fld>
             <a:endParaRPr lang="en-US"/>
           </a:p>
@@ -7598,7 +7604,7 @@
           <a:p>
             <a:fld id="{B47DF217-C59D-452D-8E59-553006198AD7}" type="datetimeFigureOut">
               <a:rPr lang="en-US" smtClean="0"/>
-              <a:t>10/27/2024</a:t>
+              <a:t>2/14/2025</a:t>
             </a:fld>
             <a:endParaRPr lang="en-US"/>
           </a:p>
@@ -7830,7 +7836,7 @@
           <a:p>
             <a:fld id="{B47DF217-C59D-452D-8E59-553006198AD7}" type="datetimeFigureOut">
               <a:rPr lang="en-US" smtClean="0"/>
-              <a:t>10/27/2024</a:t>
+              <a:t>2/14/2025</a:t>
             </a:fld>
             <a:endParaRPr lang="en-US"/>
           </a:p>
@@ -8211,7 +8217,7 @@
           <a:p>
             <a:fld id="{B47DF217-C59D-452D-8E59-553006198AD7}" type="datetimeFigureOut">
               <a:rPr lang="en-US" smtClean="0"/>
-              <a:t>10/27/2024</a:t>
+              <a:t>2/14/2025</a:t>
             </a:fld>
             <a:endParaRPr lang="en-US"/>
           </a:p>
@@ -8329,7 +8335,7 @@
           <a:p>
             <a:fld id="{B47DF217-C59D-452D-8E59-553006198AD7}" type="datetimeFigureOut">
               <a:rPr lang="en-US" smtClean="0"/>
-              <a:t>10/27/2024</a:t>
+              <a:t>2/14/2025</a:t>
             </a:fld>
             <a:endParaRPr lang="en-US"/>
           </a:p>
@@ -8424,7 +8430,7 @@
           <a:p>
             <a:fld id="{B47DF217-C59D-452D-8E59-553006198AD7}" type="datetimeFigureOut">
               <a:rPr lang="en-US" smtClean="0"/>
-              <a:t>10/27/2024</a:t>
+              <a:t>2/14/2025</a:t>
             </a:fld>
             <a:endParaRPr lang="en-US"/>
           </a:p>
@@ -8673,7 +8679,7 @@
           <a:p>
             <a:fld id="{B47DF217-C59D-452D-8E59-553006198AD7}" type="datetimeFigureOut">
               <a:rPr lang="en-US" smtClean="0"/>
-              <a:t>10/27/2024</a:t>
+              <a:t>2/14/2025</a:t>
             </a:fld>
             <a:endParaRPr lang="en-US"/>
           </a:p>
@@ -8953,7 +8959,7 @@
           <a:p>
             <a:fld id="{B47DF217-C59D-452D-8E59-553006198AD7}" type="datetimeFigureOut">
               <a:rPr lang="en-US" smtClean="0"/>
-              <a:t>10/27/2024</a:t>
+              <a:t>2/14/2025</a:t>
             </a:fld>
             <a:endParaRPr lang="en-US"/>
           </a:p>
@@ -12020,7 +12026,7 @@
           <a:p>
             <a:fld id="{B47DF217-C59D-452D-8E59-553006198AD7}" type="datetimeFigureOut">
               <a:rPr lang="en-US" smtClean="0"/>
-              <a:t>10/27/2024</a:t>
+              <a:t>2/14/2025</a:t>
             </a:fld>
             <a:endParaRPr lang="en-US"/>
           </a:p>
@@ -12531,6 +12537,183 @@
           <p:cNvPr id="2" name="Title 1">
             <a:extLst>
               <a:ext uri="{FF2B5EF4-FFF2-40B4-BE49-F238E27FC236}">
+                <a16:creationId xmlns:a16="http://schemas.microsoft.com/office/drawing/2014/main" id="{C5BF4E5D-AF45-D99A-2B6F-15892826CDDD}"/>
+              </a:ext>
+            </a:extLst>
+          </p:cNvPr>
+          <p:cNvSpPr>
+            <a:spLocks noGrp="1"/>
+          </p:cNvSpPr>
+          <p:nvPr>
+            <p:ph type="title"/>
+          </p:nvPr>
+        </p:nvSpPr>
+        <p:spPr/>
+        <p:txBody>
+          <a:bodyPr/>
+          <a:lstStyle/>
+          <a:p>
+            <a:r>
+              <a:rPr lang="en-US" dirty="0"/>
+              <a:t>Project Milestones</a:t>
+            </a:r>
+          </a:p>
+        </p:txBody>
+      </p:sp>
+      <p:sp>
+        <p:nvSpPr>
+          <p:cNvPr id="3" name="Content Placeholder 2">
+            <a:extLst>
+              <a:ext uri="{FF2B5EF4-FFF2-40B4-BE49-F238E27FC236}">
+                <a16:creationId xmlns:a16="http://schemas.microsoft.com/office/drawing/2014/main" id="{0D7DEE6E-0A9D-F65D-4BA9-987A1F2DCE3F}"/>
+              </a:ext>
+            </a:extLst>
+          </p:cNvPr>
+          <p:cNvSpPr>
+            <a:spLocks noGrp="1"/>
+          </p:cNvSpPr>
+          <p:nvPr>
+            <p:ph idx="1"/>
+          </p:nvPr>
+        </p:nvSpPr>
+        <p:spPr>
+          <a:xfrm>
+            <a:off x="1141412" y="2249486"/>
+            <a:ext cx="9905999" cy="4208463"/>
+          </a:xfrm>
+        </p:spPr>
+        <p:txBody>
+          <a:bodyPr>
+            <a:normAutofit fontScale="55000" lnSpcReduction="20000"/>
+          </a:bodyPr>
+          <a:lstStyle/>
+          <a:p>
+            <a:r>
+              <a:rPr lang="en-US" sz="2900" dirty="0"/>
+              <a:t>Milestone #1: Template App Architecture Design</a:t>
+            </a:r>
+          </a:p>
+          <a:p>
+            <a:pPr lvl="1"/>
+            <a:r>
+              <a:rPr lang="en-US" sz="2900" dirty="0"/>
+              <a:t>Designing all aspects of the apps such as communication processing structure, device firmware update (DFU) process, PE pub sub, widgets spec, etc.</a:t>
+            </a:r>
+          </a:p>
+          <a:p>
+            <a:r>
+              <a:rPr lang="en-US" sz="2900" dirty="0"/>
+              <a:t>Milestone #2: Demo Mode UI App</a:t>
+            </a:r>
+          </a:p>
+          <a:p>
+            <a:pPr lvl="1"/>
+            <a:r>
+              <a:rPr lang="en-US" sz="2900" dirty="0"/>
+              <a:t>Template app framework with completed collection of widgets.</a:t>
+            </a:r>
+          </a:p>
+          <a:p>
+            <a:r>
+              <a:rPr lang="en-US" sz="2900" dirty="0"/>
+              <a:t>Milestone #3: Bluetooth &amp; Connectivity</a:t>
+            </a:r>
+          </a:p>
+          <a:p>
+            <a:pPr lvl="1"/>
+            <a:r>
+              <a:rPr lang="en-US" sz="2900" dirty="0"/>
+              <a:t>Communication processing library &amp; BLE library.</a:t>
+            </a:r>
+          </a:p>
+          <a:p>
+            <a:r>
+              <a:rPr lang="en-US" sz="2900" dirty="0"/>
+              <a:t>Milestone #4: Comprehensive Test Framework</a:t>
+            </a:r>
+          </a:p>
+          <a:p>
+            <a:pPr lvl="1"/>
+            <a:r>
+              <a:rPr lang="en-US" sz="2900" dirty="0"/>
+              <a:t>Unit tests for each individual microservice and system tests for entire architecture.</a:t>
+            </a:r>
+          </a:p>
+          <a:p>
+            <a:r>
+              <a:rPr lang="en-US" sz="2900" dirty="0"/>
+              <a:t>Milestone #5: Finalized Documentation &amp; Deliverables</a:t>
+            </a:r>
+          </a:p>
+          <a:p>
+            <a:pPr lvl="1"/>
+            <a:r>
+              <a:rPr lang="en-US" sz="2900" dirty="0"/>
+              <a:t>Final documentation for expo in Spring 2025.</a:t>
+            </a:r>
+          </a:p>
+          <a:p>
+            <a:pPr marL="0" indent="0">
+              <a:buNone/>
+            </a:pPr>
+            <a:endParaRPr lang="en-US" dirty="0"/>
+          </a:p>
+          <a:p>
+            <a:r>
+              <a:rPr lang="en-US" sz="1900" dirty="0"/>
+              <a:t>More comprehensive &amp; detailed breakdown of milestones can be found on </a:t>
+            </a:r>
+            <a:r>
+              <a:rPr lang="en-US" sz="1900" dirty="0">
+                <a:hlinkClick r:id="rId2"/>
+              </a:rPr>
+              <a:t>GitHub</a:t>
+            </a:r>
+            <a:r>
+              <a:rPr lang="en-US" sz="1900" dirty="0"/>
+              <a:t>.</a:t>
+            </a:r>
+          </a:p>
+          <a:p>
+            <a:endParaRPr lang="en-US" dirty="0"/>
+          </a:p>
+        </p:txBody>
+      </p:sp>
+    </p:spTree>
+    <p:extLst>
+      <p:ext uri="{BB962C8B-B14F-4D97-AF65-F5344CB8AC3E}">
+        <p14:creationId xmlns:p14="http://schemas.microsoft.com/office/powerpoint/2010/main" val="3188479372"/>
+      </p:ext>
+    </p:extLst>
+  </p:cSld>
+  <p:clrMapOvr>
+    <a:masterClrMapping/>
+  </p:clrMapOvr>
+</p:sld>
+</file>
+
+<file path=ppt/slides/slide11.xml><?xml version="1.0" encoding="utf-8"?>
+<p:sld xmlns:a="http://schemas.openxmlformats.org/drawingml/2006/main" xmlns:r="http://schemas.openxmlformats.org/officeDocument/2006/relationships" xmlns:p="http://schemas.openxmlformats.org/presentationml/2006/main">
+  <p:cSld>
+    <p:spTree>
+      <p:nvGrpSpPr>
+        <p:cNvPr id="1" name=""/>
+        <p:cNvGrpSpPr/>
+        <p:nvPr/>
+      </p:nvGrpSpPr>
+      <p:grpSpPr>
+        <a:xfrm>
+          <a:off x="0" y="0"/>
+          <a:ext cx="0" cy="0"/>
+          <a:chOff x="0" y="0"/>
+          <a:chExt cx="0" cy="0"/>
+        </a:xfrm>
+      </p:grpSpPr>
+      <p:sp>
+        <p:nvSpPr>
+          <p:cNvPr id="2" name="Title 1">
+            <a:extLst>
+              <a:ext uri="{FF2B5EF4-FFF2-40B4-BE49-F238E27FC236}">
                 <a16:creationId xmlns:a16="http://schemas.microsoft.com/office/drawing/2014/main" id="{FE149205-D2DD-ADC4-2D86-BE1E86966B7E}"/>
               </a:ext>
             </a:extLst>
@@ -12542,7 +12725,12 @@
             <p:ph type="title"/>
           </p:nvPr>
         </p:nvSpPr>
-        <p:spPr/>
+        <p:spPr>
+          <a:xfrm>
+            <a:off x="1141413" y="618518"/>
+            <a:ext cx="9905998" cy="1033000"/>
+          </a:xfrm>
+        </p:spPr>
         <p:txBody>
           <a:bodyPr/>
           <a:lstStyle/>
@@ -12570,7 +12758,12 @@
             <p:ph idx="1"/>
           </p:nvPr>
         </p:nvSpPr>
-        <p:spPr/>
+        <p:spPr>
+          <a:xfrm>
+            <a:off x="1141412" y="1530220"/>
+            <a:ext cx="9905999" cy="4260981"/>
+          </a:xfrm>
+        </p:spPr>
         <p:txBody>
           <a:bodyPr>
             <a:normAutofit/>
@@ -12579,7 +12772,15 @@
           <a:p>
             <a:r>
               <a:rPr lang="en-US" sz="2000" dirty="0"/>
-              <a:t>Currently, as of the week of October 20, 2024, I am working on project milestone #3. I am presently working on a comprehensive test suite to enable BLE communication. This goes in line with the timeline that I set at the beginning of the semester. I aim to have this milestone completed by the end of 2024.</a:t>
+              <a:t>Currently, I am working on project milestone #3. The first implementation app of this Android architecture has a pretty extensive BLE profile, which requires a great deal of effort. As far as the templated structure is concerned, this milestone is complete. However, with PE, I am working on </a:t>
+            </a:r>
+            <a:r>
+              <a:rPr lang="en-US" sz="2000" i="1" dirty="0"/>
+              <a:t>both</a:t>
+            </a:r>
+            <a:r>
+              <a:rPr lang="en-US" sz="2000" dirty="0"/>
+              <a:t> this capstone project &amp; the first implementation of it simultaneously. I had originally aimed to have this milestone completed by the end of 2024, so this does put me slightly behind schedule. However, I’ve made progress on the future milestones, despite not being fully completed with milestone #3.</a:t>
             </a:r>
           </a:p>
         </p:txBody>
@@ -12606,8 +12807,8 @@
         </p:blipFill>
         <p:spPr>
           <a:xfrm>
-            <a:off x="2733422" y="3855906"/>
-            <a:ext cx="6725155" cy="2636969"/>
+            <a:off x="3058662" y="4199692"/>
+            <a:ext cx="6074676" cy="2381913"/>
           </a:xfrm>
           <a:prstGeom prst="rect">
             <a:avLst/>
@@ -12627,7 +12828,7 @@
 </p:sld>
 </file>
 
-<file path=ppt/slides/slide11.xml><?xml version="1.0" encoding="utf-8"?>
+<file path=ppt/slides/slide12.xml><?xml version="1.0" encoding="utf-8"?>
 <p:sld xmlns:a="http://schemas.openxmlformats.org/drawingml/2006/main" xmlns:r="http://schemas.openxmlformats.org/officeDocument/2006/relationships" xmlns:p="http://schemas.openxmlformats.org/presentationml/2006/main">
   <p:cSld>
     <p:spTree>
@@ -12690,12 +12891,14 @@
         </p:nvSpPr>
         <p:spPr/>
         <p:txBody>
-          <a:bodyPr/>
+          <a:bodyPr>
+            <a:normAutofit/>
+          </a:bodyPr>
           <a:lstStyle/>
           <a:p>
             <a:r>
               <a:rPr lang="en-US" dirty="0"/>
-              <a:t>My timeline outlines that I’ll be nearing the completion of milestone #3 by the end of this semester. Thus, there isn’t a list of concrete deliverables that I plan on supplying at the end of the semester. The semester break for me, is nothing significant in the scope of this project. I’ll continue development past the end of the semester in order to reach the end goal next April/May.</a:t>
+              <a:t>The final capstone project is due here in early April. With that deadline closing in fast, I am making an effort to prioritize the remaining deliverables. I’m still confident with the status of the project &amp; my ability to deliver a finished product on time. The majority of my time in March will be spent on documentation &amp; testing, as much of the functionality is polished. I plan to spend ~1 week creating an extra implementation of the architecture, so that I can demonstrate how efficient creating new apps is with the architecture.</a:t>
             </a:r>
           </a:p>
         </p:txBody>
@@ -12713,7 +12916,7 @@
 </p:sld>
 </file>
 
-<file path=ppt/slides/slide12.xml><?xml version="1.0" encoding="utf-8"?>
+<file path=ppt/slides/slide13.xml><?xml version="1.0" encoding="utf-8"?>
 <p:sld xmlns:a="http://schemas.openxmlformats.org/drawingml/2006/main" xmlns:r="http://schemas.openxmlformats.org/officeDocument/2006/relationships" xmlns:p="http://schemas.openxmlformats.org/presentationml/2006/main">
   <p:cSld>
     <p:spTree>
@@ -12993,7 +13196,7 @@
 </p:sld>
 </file>
 
-<file path=ppt/slides/slide13.xml><?xml version="1.0" encoding="utf-8"?>
+<file path=ppt/slides/slide14.xml><?xml version="1.0" encoding="utf-8"?>
 <p:sld xmlns:a="http://schemas.openxmlformats.org/drawingml/2006/main" xmlns:r="http://schemas.openxmlformats.org/officeDocument/2006/relationships" xmlns:p="http://schemas.openxmlformats.org/presentationml/2006/main">
   <p:cSld>
     <p:spTree>
@@ -13082,7 +13285,7 @@
           <a:p>
             <a:r>
               <a:rPr lang="en-US" dirty="0"/>
-              <a:t>Need hardware to communicate with each app being used</a:t>
+              <a:t>I may bring hardware to communicate with each app being used</a:t>
             </a:r>
           </a:p>
           <a:p>
@@ -13113,7 +13316,7 @@
 </p:sld>
 </file>
 
-<file path=ppt/slides/slide14.xml><?xml version="1.0" encoding="utf-8"?>
+<file path=ppt/slides/slide15.xml><?xml version="1.0" encoding="utf-8"?>
 <p:sld xmlns:a="http://schemas.openxmlformats.org/drawingml/2006/main" xmlns:r="http://schemas.openxmlformats.org/officeDocument/2006/relationships" xmlns:p="http://schemas.openxmlformats.org/presentationml/2006/main">
   <p:cSld>
     <p:spTree>
@@ -13596,7 +13799,7 @@
         <p:spPr>
           <a:xfrm>
             <a:off x="838201" y="1825625"/>
-            <a:ext cx="2190749" cy="4351338"/>
+            <a:ext cx="6085113" cy="730963"/>
           </a:xfrm>
         </p:spPr>
         <p:txBody>
@@ -13638,7 +13841,7 @@
         </p:blipFill>
         <p:spPr>
           <a:xfrm>
-            <a:off x="7296151" y="2012523"/>
+            <a:off x="6398579" y="618518"/>
             <a:ext cx="4226306" cy="2832954"/>
           </a:xfrm>
           <a:prstGeom prst="rect">
@@ -13684,8 +13887,53 @@
         </p:blipFill>
         <p:spPr>
           <a:xfrm>
-            <a:off x="3028950" y="2252155"/>
-            <a:ext cx="4095749" cy="2353690"/>
+            <a:off x="1352739" y="2560807"/>
+            <a:ext cx="4611316" cy="2649969"/>
+          </a:xfrm>
+          <a:prstGeom prst="rect">
+            <a:avLst/>
+          </a:prstGeom>
+          <a:ln>
+            <a:noFill/>
+          </a:ln>
+          <a:effectLst>
+            <a:outerShdw blurRad="292100" dist="139700" dir="2700000" algn="tl" rotWithShape="0">
+              <a:srgbClr val="333333">
+                <a:alpha val="65000"/>
+              </a:srgbClr>
+            </a:outerShdw>
+          </a:effectLst>
+        </p:spPr>
+      </p:pic>
+      <p:pic>
+        <p:nvPicPr>
+          <p:cNvPr id="7" name="Picture 6">
+            <a:extLst>
+              <a:ext uri="{FF2B5EF4-FFF2-40B4-BE49-F238E27FC236}">
+                <a16:creationId xmlns:a16="http://schemas.microsoft.com/office/drawing/2014/main" id="{328C0777-94EA-0F45-B7B7-DCCB23BC4E26}"/>
+              </a:ext>
+            </a:extLst>
+          </p:cNvPr>
+          <p:cNvPicPr>
+            <a:picLocks noChangeAspect="1"/>
+          </p:cNvPicPr>
+          <p:nvPr/>
+        </p:nvPicPr>
+        <p:blipFill>
+          <a:blip r:embed="rId4">
+            <a:extLst>
+              <a:ext uri="{28A0092B-C50C-407E-A947-70E740481C1C}">
+                <a14:useLocalDpi xmlns:a14="http://schemas.microsoft.com/office/drawing/2010/main" val="0"/>
+              </a:ext>
+            </a:extLst>
+          </a:blip>
+          <a:srcRect t="1425"/>
+          <a:stretch/>
+        </p:blipFill>
+        <p:spPr>
+          <a:xfrm>
+            <a:off x="6227946" y="3548173"/>
+            <a:ext cx="4567573" cy="3146182"/>
           </a:xfrm>
           <a:prstGeom prst="rect">
             <a:avLst/>
@@ -13801,10 +14049,10 @@
       </p:sp>
       <p:pic>
         <p:nvPicPr>
-          <p:cNvPr id="7" name="Picture 6">
+          <p:cNvPr id="5" name="Picture 4">
             <a:extLst>
               <a:ext uri="{FF2B5EF4-FFF2-40B4-BE49-F238E27FC236}">
-                <a16:creationId xmlns:a16="http://schemas.microsoft.com/office/drawing/2014/main" id="{328C0777-94EA-0F45-B7B7-DCCB23BC4E26}"/>
+                <a16:creationId xmlns:a16="http://schemas.microsoft.com/office/drawing/2014/main" id="{8FFE5797-48FD-20E5-2ACB-919B89FAA0DB}"/>
               </a:ext>
             </a:extLst>
           </p:cNvPr>
@@ -13821,27 +14069,18 @@
               </a:ext>
             </a:extLst>
           </a:blip>
-          <a:srcRect t="1425"/>
-          <a:stretch/>
+          <a:stretch>
+            <a:fillRect/>
+          </a:stretch>
         </p:blipFill>
         <p:spPr>
           <a:xfrm>
-            <a:off x="4840701" y="1690687"/>
-            <a:ext cx="6513100" cy="4486276"/>
+            <a:off x="3254374" y="1755776"/>
+            <a:ext cx="8096250" cy="4762500"/>
           </a:xfrm>
           <a:prstGeom prst="rect">
             <a:avLst/>
           </a:prstGeom>
-          <a:ln>
-            <a:noFill/>
-          </a:ln>
-          <a:effectLst>
-            <a:outerShdw blurRad="292100" dist="139700" dir="2700000" algn="tl" rotWithShape="0">
-              <a:srgbClr val="333333">
-                <a:alpha val="65000"/>
-              </a:srgbClr>
-            </a:outerShdw>
-          </a:effectLst>
         </p:spPr>
       </p:pic>
     </p:spTree>
@@ -13858,6 +14097,288 @@
 </file>
 
 <file path=ppt/slides/slide7.xml><?xml version="1.0" encoding="utf-8"?>
+<p:sld xmlns:a="http://schemas.openxmlformats.org/drawingml/2006/main" xmlns:r="http://schemas.openxmlformats.org/officeDocument/2006/relationships" xmlns:p="http://schemas.openxmlformats.org/presentationml/2006/main">
+  <p:cSld>
+    <p:spTree>
+      <p:nvGrpSpPr>
+        <p:cNvPr id="1" name="">
+          <a:extLst>
+            <a:ext uri="{FF2B5EF4-FFF2-40B4-BE49-F238E27FC236}">
+              <a16:creationId xmlns:a16="http://schemas.microsoft.com/office/drawing/2014/main" id="{F2841BA5-C9C3-36AA-5862-0F7092E139D0}"/>
+            </a:ext>
+          </a:extLst>
+        </p:cNvPr>
+        <p:cNvGrpSpPr/>
+        <p:nvPr/>
+      </p:nvGrpSpPr>
+      <p:grpSpPr>
+        <a:xfrm>
+          <a:off x="0" y="0"/>
+          <a:ext cx="0" cy="0"/>
+          <a:chOff x="0" y="0"/>
+          <a:chExt cx="0" cy="0"/>
+        </a:xfrm>
+      </p:grpSpPr>
+      <p:sp>
+        <p:nvSpPr>
+          <p:cNvPr id="2" name="Title 1">
+            <a:extLst>
+              <a:ext uri="{FF2B5EF4-FFF2-40B4-BE49-F238E27FC236}">
+                <a16:creationId xmlns:a16="http://schemas.microsoft.com/office/drawing/2014/main" id="{88425D28-C721-11BE-2A70-16BAC3056724}"/>
+              </a:ext>
+            </a:extLst>
+          </p:cNvPr>
+          <p:cNvSpPr>
+            <a:spLocks noGrp="1"/>
+          </p:cNvSpPr>
+          <p:nvPr>
+            <p:ph type="title"/>
+          </p:nvPr>
+        </p:nvSpPr>
+        <p:spPr>
+          <a:xfrm>
+            <a:off x="1141413" y="618518"/>
+            <a:ext cx="9905998" cy="827727"/>
+          </a:xfrm>
+        </p:spPr>
+        <p:txBody>
+          <a:bodyPr/>
+          <a:lstStyle/>
+          <a:p>
+            <a:r>
+              <a:rPr lang="en-US" dirty="0"/>
+              <a:t>Design Diagrams cont.</a:t>
+            </a:r>
+          </a:p>
+        </p:txBody>
+      </p:sp>
+      <p:sp>
+        <p:nvSpPr>
+          <p:cNvPr id="3" name="Content Placeholder 2">
+            <a:extLst>
+              <a:ext uri="{FF2B5EF4-FFF2-40B4-BE49-F238E27FC236}">
+                <a16:creationId xmlns:a16="http://schemas.microsoft.com/office/drawing/2014/main" id="{A7735B47-55ED-5C21-3AE1-375D4D5AC141}"/>
+              </a:ext>
+            </a:extLst>
+          </p:cNvPr>
+          <p:cNvSpPr>
+            <a:spLocks noGrp="1"/>
+          </p:cNvSpPr>
+          <p:nvPr>
+            <p:ph idx="1"/>
+          </p:nvPr>
+        </p:nvSpPr>
+        <p:spPr>
+          <a:xfrm>
+            <a:off x="1141412" y="1446244"/>
+            <a:ext cx="9905999" cy="5141168"/>
+          </a:xfrm>
+        </p:spPr>
+        <p:txBody>
+          <a:bodyPr>
+            <a:normAutofit fontScale="70000" lnSpcReduction="20000"/>
+          </a:bodyPr>
+          <a:lstStyle/>
+          <a:p>
+            <a:r>
+              <a:rPr lang="en-US" dirty="0"/>
+              <a:t>UI Specification Document</a:t>
+            </a:r>
+          </a:p>
+          <a:p>
+            <a:pPr lvl="1"/>
+            <a:r>
+              <a:rPr lang="en-US" dirty="0"/>
+              <a:t>For this project, I created an extensive, 100+ page UI specification document. This UI spec contains information about each of the widgets, their configurable attributes, images showcasing themes, and more.</a:t>
+            </a:r>
+          </a:p>
+          <a:p>
+            <a:pPr lvl="1"/>
+            <a:r>
+              <a:rPr lang="en-US" dirty="0"/>
+              <a:t>The full UI spec is proprietary &amp; not available for public consumption. However, a demo version has been made publicly accessible for the sake of this project. I should hopefully offer a glimpse at the depth to which our design phase went.</a:t>
+            </a:r>
+          </a:p>
+          <a:p>
+            <a:pPr lvl="1"/>
+            <a:r>
+              <a:rPr lang="en-US" dirty="0"/>
+              <a:t>Example:</a:t>
+            </a:r>
+          </a:p>
+          <a:p>
+            <a:pPr marL="0" indent="0">
+              <a:buNone/>
+            </a:pPr>
+            <a:endParaRPr lang="en-US" dirty="0"/>
+          </a:p>
+          <a:p>
+            <a:pPr marL="0" indent="0">
+              <a:buNone/>
+            </a:pPr>
+            <a:endParaRPr lang="en-US" dirty="0"/>
+          </a:p>
+          <a:p>
+            <a:pPr marL="0" indent="0">
+              <a:buNone/>
+            </a:pPr>
+            <a:endParaRPr lang="en-US" dirty="0"/>
+          </a:p>
+          <a:p>
+            <a:pPr marL="0" indent="0">
+              <a:buNone/>
+            </a:pPr>
+            <a:endParaRPr lang="en-US" dirty="0"/>
+          </a:p>
+          <a:p>
+            <a:pPr marL="0" indent="0">
+              <a:buNone/>
+            </a:pPr>
+            <a:endParaRPr lang="en-US" dirty="0"/>
+          </a:p>
+          <a:p>
+            <a:pPr marL="0" indent="0">
+              <a:buNone/>
+            </a:pPr>
+            <a:endParaRPr lang="en-US" dirty="0"/>
+          </a:p>
+          <a:p>
+            <a:pPr marL="0" indent="0">
+              <a:buNone/>
+            </a:pPr>
+            <a:endParaRPr lang="en-US" dirty="0"/>
+          </a:p>
+          <a:p>
+            <a:pPr marL="0" indent="0">
+              <a:buNone/>
+            </a:pPr>
+            <a:endParaRPr lang="en-US" dirty="0"/>
+          </a:p>
+          <a:p>
+            <a:pPr marL="0" indent="0">
+              <a:buNone/>
+            </a:pPr>
+            <a:r>
+              <a:rPr lang="en-US" sz="1900" dirty="0"/>
+              <a:t>The demo UI specification document can be found on the GitHub repository: </a:t>
+            </a:r>
+            <a:r>
+              <a:rPr lang="en-US" sz="1900" dirty="0">
+                <a:hlinkClick r:id="rId2"/>
+              </a:rPr>
+              <a:t>https://github.com/JPEG1/Senior-Design/tree/main</a:t>
+            </a:r>
+            <a:endParaRPr lang="en-US" sz="1900" dirty="0"/>
+          </a:p>
+        </p:txBody>
+      </p:sp>
+      <p:grpSp>
+        <p:nvGrpSpPr>
+          <p:cNvPr id="8" name="Group 7">
+            <a:extLst>
+              <a:ext uri="{FF2B5EF4-FFF2-40B4-BE49-F238E27FC236}">
+                <a16:creationId xmlns:a16="http://schemas.microsoft.com/office/drawing/2014/main" id="{36839D3A-02D8-2A96-6813-12D4BE66B63F}"/>
+              </a:ext>
+            </a:extLst>
+          </p:cNvPr>
+          <p:cNvGrpSpPr/>
+          <p:nvPr/>
+        </p:nvGrpSpPr>
+        <p:grpSpPr>
+          <a:xfrm>
+            <a:off x="2050115" y="3123058"/>
+            <a:ext cx="8088591" cy="2995126"/>
+            <a:chOff x="1664421" y="3183003"/>
+            <a:chExt cx="8088591" cy="2995126"/>
+          </a:xfrm>
+        </p:grpSpPr>
+        <p:pic>
+          <p:nvPicPr>
+            <p:cNvPr id="5" name="Picture 4">
+              <a:extLst>
+                <a:ext uri="{FF2B5EF4-FFF2-40B4-BE49-F238E27FC236}">
+                  <a16:creationId xmlns:a16="http://schemas.microsoft.com/office/drawing/2014/main" id="{9354051D-BC12-CA78-2909-2D83D91108A6}"/>
+                </a:ext>
+              </a:extLst>
+            </p:cNvPr>
+            <p:cNvPicPr>
+              <a:picLocks noChangeAspect="1"/>
+            </p:cNvPicPr>
+            <p:nvPr/>
+          </p:nvPicPr>
+          <p:blipFill>
+            <a:blip r:embed="rId3">
+              <a:extLst>
+                <a:ext uri="{28A0092B-C50C-407E-A947-70E740481C1C}">
+                  <a14:useLocalDpi xmlns:a14="http://schemas.microsoft.com/office/drawing/2010/main" val="0"/>
+                </a:ext>
+              </a:extLst>
+            </a:blip>
+            <a:stretch>
+              <a:fillRect/>
+            </a:stretch>
+          </p:blipFill>
+          <p:spPr>
+            <a:xfrm>
+              <a:off x="5755317" y="3183003"/>
+              <a:ext cx="3997695" cy="2995125"/>
+            </a:xfrm>
+            <a:prstGeom prst="rect">
+              <a:avLst/>
+            </a:prstGeom>
+          </p:spPr>
+        </p:pic>
+        <p:pic>
+          <p:nvPicPr>
+            <p:cNvPr id="7" name="Picture 6">
+              <a:extLst>
+                <a:ext uri="{FF2B5EF4-FFF2-40B4-BE49-F238E27FC236}">
+                  <a16:creationId xmlns:a16="http://schemas.microsoft.com/office/drawing/2014/main" id="{9ED70DCD-E4D3-6E67-DBF6-356BAE839FDF}"/>
+                </a:ext>
+              </a:extLst>
+            </p:cNvPr>
+            <p:cNvPicPr>
+              <a:picLocks noChangeAspect="1"/>
+            </p:cNvPicPr>
+            <p:nvPr/>
+          </p:nvPicPr>
+          <p:blipFill>
+            <a:blip r:embed="rId4">
+              <a:extLst>
+                <a:ext uri="{28A0092B-C50C-407E-A947-70E740481C1C}">
+                  <a14:useLocalDpi xmlns:a14="http://schemas.microsoft.com/office/drawing/2010/main" val="0"/>
+                </a:ext>
+              </a:extLst>
+            </a:blip>
+            <a:stretch>
+              <a:fillRect/>
+            </a:stretch>
+          </p:blipFill>
+          <p:spPr>
+            <a:xfrm>
+              <a:off x="1664421" y="3183003"/>
+              <a:ext cx="3973980" cy="2995126"/>
+            </a:xfrm>
+            <a:prstGeom prst="rect">
+              <a:avLst/>
+            </a:prstGeom>
+          </p:spPr>
+        </p:pic>
+      </p:grpSp>
+    </p:spTree>
+    <p:extLst>
+      <p:ext uri="{BB962C8B-B14F-4D97-AF65-F5344CB8AC3E}">
+        <p14:creationId xmlns:p14="http://schemas.microsoft.com/office/powerpoint/2010/main" val="2266156354"/>
+      </p:ext>
+    </p:extLst>
+  </p:cSld>
+  <p:clrMapOvr>
+    <a:masterClrMapping/>
+  </p:clrMapOvr>
+</p:sld>
+</file>
+
+<file path=ppt/slides/slide8.xml><?xml version="1.0" encoding="utf-8"?>
 <p:sld xmlns:a="http://schemas.openxmlformats.org/drawingml/2006/main" xmlns:r="http://schemas.openxmlformats.org/officeDocument/2006/relationships" xmlns:p="http://schemas.openxmlformats.org/presentationml/2006/main">
   <p:cSld>
     <p:spTree>
@@ -14049,7 +14570,7 @@
 </p:sld>
 </file>
 
-<file path=ppt/slides/slide8.xml><?xml version="1.0" encoding="utf-8"?>
+<file path=ppt/slides/slide9.xml><?xml version="1.0" encoding="utf-8"?>
 <p:sld xmlns:a="http://schemas.openxmlformats.org/drawingml/2006/main" xmlns:r="http://schemas.openxmlformats.org/officeDocument/2006/relationships" xmlns:p="http://schemas.openxmlformats.org/presentationml/2006/main">
   <p:cSld>
     <p:spTree>
@@ -14180,183 +14701,6 @@
     <p:extLst>
       <p:ext uri="{BB962C8B-B14F-4D97-AF65-F5344CB8AC3E}">
         <p14:creationId xmlns:p14="http://schemas.microsoft.com/office/powerpoint/2010/main" val="876797859"/>
-      </p:ext>
-    </p:extLst>
-  </p:cSld>
-  <p:clrMapOvr>
-    <a:masterClrMapping/>
-  </p:clrMapOvr>
-</p:sld>
-</file>
-
-<file path=ppt/slides/slide9.xml><?xml version="1.0" encoding="utf-8"?>
-<p:sld xmlns:a="http://schemas.openxmlformats.org/drawingml/2006/main" xmlns:r="http://schemas.openxmlformats.org/officeDocument/2006/relationships" xmlns:p="http://schemas.openxmlformats.org/presentationml/2006/main">
-  <p:cSld>
-    <p:spTree>
-      <p:nvGrpSpPr>
-        <p:cNvPr id="1" name=""/>
-        <p:cNvGrpSpPr/>
-        <p:nvPr/>
-      </p:nvGrpSpPr>
-      <p:grpSpPr>
-        <a:xfrm>
-          <a:off x="0" y="0"/>
-          <a:ext cx="0" cy="0"/>
-          <a:chOff x="0" y="0"/>
-          <a:chExt cx="0" cy="0"/>
-        </a:xfrm>
-      </p:grpSpPr>
-      <p:sp>
-        <p:nvSpPr>
-          <p:cNvPr id="2" name="Title 1">
-            <a:extLst>
-              <a:ext uri="{FF2B5EF4-FFF2-40B4-BE49-F238E27FC236}">
-                <a16:creationId xmlns:a16="http://schemas.microsoft.com/office/drawing/2014/main" id="{C5BF4E5D-AF45-D99A-2B6F-15892826CDDD}"/>
-              </a:ext>
-            </a:extLst>
-          </p:cNvPr>
-          <p:cNvSpPr>
-            <a:spLocks noGrp="1"/>
-          </p:cNvSpPr>
-          <p:nvPr>
-            <p:ph type="title"/>
-          </p:nvPr>
-        </p:nvSpPr>
-        <p:spPr/>
-        <p:txBody>
-          <a:bodyPr/>
-          <a:lstStyle/>
-          <a:p>
-            <a:r>
-              <a:rPr lang="en-US" dirty="0"/>
-              <a:t>Project Milestones</a:t>
-            </a:r>
-          </a:p>
-        </p:txBody>
-      </p:sp>
-      <p:sp>
-        <p:nvSpPr>
-          <p:cNvPr id="3" name="Content Placeholder 2">
-            <a:extLst>
-              <a:ext uri="{FF2B5EF4-FFF2-40B4-BE49-F238E27FC236}">
-                <a16:creationId xmlns:a16="http://schemas.microsoft.com/office/drawing/2014/main" id="{0D7DEE6E-0A9D-F65D-4BA9-987A1F2DCE3F}"/>
-              </a:ext>
-            </a:extLst>
-          </p:cNvPr>
-          <p:cNvSpPr>
-            <a:spLocks noGrp="1"/>
-          </p:cNvSpPr>
-          <p:nvPr>
-            <p:ph idx="1"/>
-          </p:nvPr>
-        </p:nvSpPr>
-        <p:spPr>
-          <a:xfrm>
-            <a:off x="1141412" y="2249486"/>
-            <a:ext cx="9905999" cy="4208463"/>
-          </a:xfrm>
-        </p:spPr>
-        <p:txBody>
-          <a:bodyPr>
-            <a:normAutofit fontScale="55000" lnSpcReduction="20000"/>
-          </a:bodyPr>
-          <a:lstStyle/>
-          <a:p>
-            <a:r>
-              <a:rPr lang="en-US" sz="2900" dirty="0"/>
-              <a:t>Milestone #1: Template App Architecture Design</a:t>
-            </a:r>
-          </a:p>
-          <a:p>
-            <a:pPr lvl="1"/>
-            <a:r>
-              <a:rPr lang="en-US" sz="2900" dirty="0"/>
-              <a:t>Designing all aspects of the apps such as communication processing structure, device firmware update (DFU) process, PE pub sub, widgets spec, etc.</a:t>
-            </a:r>
-          </a:p>
-          <a:p>
-            <a:r>
-              <a:rPr lang="en-US" sz="2900" dirty="0"/>
-              <a:t>Milestone #2: Demo Mode UI App</a:t>
-            </a:r>
-          </a:p>
-          <a:p>
-            <a:pPr lvl="1"/>
-            <a:r>
-              <a:rPr lang="en-US" sz="2900" dirty="0"/>
-              <a:t>Template app framework with completed collection of widgets.</a:t>
-            </a:r>
-          </a:p>
-          <a:p>
-            <a:r>
-              <a:rPr lang="en-US" sz="2900" dirty="0"/>
-              <a:t>Milestone #3: Bluetooth &amp; Connectivity</a:t>
-            </a:r>
-          </a:p>
-          <a:p>
-            <a:pPr lvl="1"/>
-            <a:r>
-              <a:rPr lang="en-US" sz="2900" dirty="0"/>
-              <a:t>Communication processing library &amp; BLE library.</a:t>
-            </a:r>
-          </a:p>
-          <a:p>
-            <a:r>
-              <a:rPr lang="en-US" sz="2900" dirty="0"/>
-              <a:t>Milestone #4: Comprehensive Test Framework</a:t>
-            </a:r>
-          </a:p>
-          <a:p>
-            <a:pPr lvl="1"/>
-            <a:r>
-              <a:rPr lang="en-US" sz="2900" dirty="0"/>
-              <a:t>Unit tests for each individual microservice and system tests for entire architecture.</a:t>
-            </a:r>
-          </a:p>
-          <a:p>
-            <a:r>
-              <a:rPr lang="en-US" sz="2900" dirty="0"/>
-              <a:t>Milestone #5: Finalized Documentation &amp; Deliverables</a:t>
-            </a:r>
-          </a:p>
-          <a:p>
-            <a:pPr lvl="1"/>
-            <a:r>
-              <a:rPr lang="en-US" sz="2900" dirty="0"/>
-              <a:t>Final documentation for expo in Spring 2025.</a:t>
-            </a:r>
-          </a:p>
-          <a:p>
-            <a:pPr marL="0" indent="0">
-              <a:buNone/>
-            </a:pPr>
-            <a:endParaRPr lang="en-US" dirty="0"/>
-          </a:p>
-          <a:p>
-            <a:r>
-              <a:rPr lang="en-US" sz="1900" dirty="0"/>
-              <a:t>More comprehensive &amp; detailed breakdown of milestones can be found on </a:t>
-            </a:r>
-            <a:r>
-              <a:rPr lang="en-US" sz="1900" dirty="0">
-                <a:hlinkClick r:id="rId2"/>
-              </a:rPr>
-              <a:t>GitHub</a:t>
-            </a:r>
-            <a:r>
-              <a:rPr lang="en-US" sz="1900" dirty="0"/>
-              <a:t>.</a:t>
-            </a:r>
-          </a:p>
-          <a:p>
-            <a:endParaRPr lang="en-US" dirty="0"/>
-          </a:p>
-        </p:txBody>
-      </p:sp>
-    </p:spTree>
-    <p:extLst>
-      <p:ext uri="{BB962C8B-B14F-4D97-AF65-F5344CB8AC3E}">
-        <p14:creationId xmlns:p14="http://schemas.microsoft.com/office/powerpoint/2010/main" val="3188479372"/>
       </p:ext>
     </p:extLst>
   </p:cSld>

</xml_diff>